<commit_message>
doc: atualizacao diagrama de componentes
</commit_message>
<xml_diff>
--- a/Documentação/EngenhariaDeSoftware/Arquitetura/ArquiteturaSoftware.pptx
+++ b/Documentação/EngenhariaDeSoftware/Arquitetura/ArquiteturaSoftware.pptx
@@ -264,7 +264,7 @@
           <a:p>
             <a:fld id="{15C30538-17BE-4D2F-958A-9FC5875DA85F}" type="datetimeFigureOut">
               <a:rPr lang="pt-BR" smtClean="0"/>
-              <a:t>03/11/2021</a:t>
+              <a:t>09/11/2021</a:t>
             </a:fld>
             <a:endParaRPr lang="pt-BR"/>
           </a:p>
@@ -462,7 +462,7 @@
           <a:p>
             <a:fld id="{15C30538-17BE-4D2F-958A-9FC5875DA85F}" type="datetimeFigureOut">
               <a:rPr lang="pt-BR" smtClean="0"/>
-              <a:t>03/11/2021</a:t>
+              <a:t>09/11/2021</a:t>
             </a:fld>
             <a:endParaRPr lang="pt-BR"/>
           </a:p>
@@ -670,7 +670,7 @@
           <a:p>
             <a:fld id="{15C30538-17BE-4D2F-958A-9FC5875DA85F}" type="datetimeFigureOut">
               <a:rPr lang="pt-BR" smtClean="0"/>
-              <a:t>03/11/2021</a:t>
+              <a:t>09/11/2021</a:t>
             </a:fld>
             <a:endParaRPr lang="pt-BR"/>
           </a:p>
@@ -1868,7 +1868,7 @@
           <a:p>
             <a:fld id="{15C30538-17BE-4D2F-958A-9FC5875DA85F}" type="datetimeFigureOut">
               <a:rPr lang="pt-BR" smtClean="0"/>
-              <a:t>03/11/2021</a:t>
+              <a:t>09/11/2021</a:t>
             </a:fld>
             <a:endParaRPr lang="pt-BR"/>
           </a:p>
@@ -2143,7 +2143,7 @@
           <a:p>
             <a:fld id="{15C30538-17BE-4D2F-958A-9FC5875DA85F}" type="datetimeFigureOut">
               <a:rPr lang="pt-BR" smtClean="0"/>
-              <a:t>03/11/2021</a:t>
+              <a:t>09/11/2021</a:t>
             </a:fld>
             <a:endParaRPr lang="pt-BR"/>
           </a:p>
@@ -2408,7 +2408,7 @@
           <a:p>
             <a:fld id="{15C30538-17BE-4D2F-958A-9FC5875DA85F}" type="datetimeFigureOut">
               <a:rPr lang="pt-BR" smtClean="0"/>
-              <a:t>03/11/2021</a:t>
+              <a:t>09/11/2021</a:t>
             </a:fld>
             <a:endParaRPr lang="pt-BR"/>
           </a:p>
@@ -2820,7 +2820,7 @@
           <a:p>
             <a:fld id="{15C30538-17BE-4D2F-958A-9FC5875DA85F}" type="datetimeFigureOut">
               <a:rPr lang="pt-BR" smtClean="0"/>
-              <a:t>03/11/2021</a:t>
+              <a:t>09/11/2021</a:t>
             </a:fld>
             <a:endParaRPr lang="pt-BR"/>
           </a:p>
@@ -2961,7 +2961,7 @@
           <a:p>
             <a:fld id="{15C30538-17BE-4D2F-958A-9FC5875DA85F}" type="datetimeFigureOut">
               <a:rPr lang="pt-BR" smtClean="0"/>
-              <a:t>03/11/2021</a:t>
+              <a:t>09/11/2021</a:t>
             </a:fld>
             <a:endParaRPr lang="pt-BR"/>
           </a:p>
@@ -3074,7 +3074,7 @@
           <a:p>
             <a:fld id="{15C30538-17BE-4D2F-958A-9FC5875DA85F}" type="datetimeFigureOut">
               <a:rPr lang="pt-BR" smtClean="0"/>
-              <a:t>03/11/2021</a:t>
+              <a:t>09/11/2021</a:t>
             </a:fld>
             <a:endParaRPr lang="pt-BR"/>
           </a:p>
@@ -3385,7 +3385,7 @@
           <a:p>
             <a:fld id="{15C30538-17BE-4D2F-958A-9FC5875DA85F}" type="datetimeFigureOut">
               <a:rPr lang="pt-BR" smtClean="0"/>
-              <a:t>03/11/2021</a:t>
+              <a:t>09/11/2021</a:t>
             </a:fld>
             <a:endParaRPr lang="pt-BR"/>
           </a:p>
@@ -3673,7 +3673,7 @@
           <a:p>
             <a:fld id="{15C30538-17BE-4D2F-958A-9FC5875DA85F}" type="datetimeFigureOut">
               <a:rPr lang="pt-BR" smtClean="0"/>
-              <a:t>03/11/2021</a:t>
+              <a:t>09/11/2021</a:t>
             </a:fld>
             <a:endParaRPr lang="pt-BR"/>
           </a:p>
@@ -3914,7 +3914,7 @@
           <a:p>
             <a:fld id="{15C30538-17BE-4D2F-958A-9FC5875DA85F}" type="datetimeFigureOut">
               <a:rPr lang="pt-BR" smtClean="0"/>
-              <a:t>03/11/2021</a:t>
+              <a:t>09/11/2021</a:t>
             </a:fld>
             <a:endParaRPr lang="pt-BR"/>
           </a:p>
@@ -20666,7 +20666,7 @@
         <p:spPr>
           <a:xfrm>
             <a:off x="1067345" y="1482026"/>
-            <a:ext cx="10057310" cy="2855077"/>
+            <a:ext cx="10057310" cy="5115503"/>
           </a:xfrm>
           <a:prstGeom prst="rect">
             <a:avLst/>
@@ -20679,12 +20679,23 @@
           </a:bodyPr>
           <a:lstStyle/>
           <a:p>
+            <a:pPr marL="285750" indent="-285750">
+              <a:buFont typeface="Arial" panose="020B0604020202020204" pitchFamily="34" charset="0"/>
+              <a:buChar char="•"/>
+            </a:pPr>
             <a:r>
               <a:rPr lang="pt-BR" sz="1632" dirty="0"/>
-              <a:t>Estamos utilizando o database do AzureSQLServer, onde ficará salvo todo nosso banco de dados e temos um backup no MYSQL, caso aconteça algum problema</a:t>
+              <a:t>Estamos utilizando o database do AzureSQLServer, onde ficará salvo todo nosso banco de dados e temos um backup no MYSQL, caso aconteça algum problema, o Azure também garante uma consistência maior de dados que podem ser acessados por aplicações, ambientes e máquinas que estão em lugares diferentes;</a:t>
             </a:r>
           </a:p>
           <a:p>
+            <a:endParaRPr lang="pt-BR" sz="1632" dirty="0"/>
+          </a:p>
+          <a:p>
+            <a:pPr marL="285750" indent="-285750">
+              <a:buFont typeface="Arial" panose="020B0604020202020204" pitchFamily="34" charset="0"/>
+              <a:buChar char="•"/>
+            </a:pPr>
             <a:r>
               <a:rPr lang="pt-BR" sz="1632" dirty="0"/>
               <a:t>Estamos usando uma </a:t>
@@ -20695,20 +20706,95 @@
             </a:r>
             <a:r>
               <a:rPr lang="pt-BR" sz="1632" dirty="0"/>
-              <a:t> do Google Books, onde será feita a requisição dos dados tudo via front e salvaremos em nosso database apenas os dados relevantes para nós, como nome, descrição, tipo do livro e também possui alguns atributos a mais que implementamos para melhor adequar o sistema, como disponibilidade do livro.</a:t>
+              <a:t> do Google Books, onde será feita a requisição dos dados tudo via front e salvaremos em nosso database apenas os dados relevantes para nós, como nome, descrição, tipo do livro e também possui alguns atributos a mais que implementamos para se adequar ao nosso sistema, como disponibilidade do livro e também disponibilizar </a:t>
+            </a:r>
+            <a:r>
+              <a:rPr lang="pt-BR" sz="1632" dirty="0" err="1"/>
+              <a:t>eBooks</a:t>
+            </a:r>
+            <a:r>
+              <a:rPr lang="pt-BR" sz="1632" dirty="0"/>
+              <a:t> e outras informações de livros que não estão em nossa base de dados;</a:t>
             </a:r>
           </a:p>
           <a:p>
+            <a:pPr marL="285750" indent="-285750">
+              <a:buFont typeface="Arial" panose="020B0604020202020204" pitchFamily="34" charset="0"/>
+              <a:buChar char="•"/>
+            </a:pPr>
+            <a:endParaRPr lang="pt-BR" sz="1632" dirty="0"/>
+          </a:p>
+          <a:p>
+            <a:pPr marL="285750" indent="-285750">
+              <a:buFont typeface="Arial" panose="020B0604020202020204" pitchFamily="34" charset="0"/>
+              <a:buChar char="•"/>
+            </a:pPr>
             <a:r>
               <a:rPr lang="pt-BR" sz="1632" dirty="0"/>
-              <a:t>A nossa web Application onde terá toda a conexão com o banco e que o nosso front vai consumir direto da nossa web Application, escolhemos a utilização de Java, pois é uma linguagem que conseguimos melhor aplicar nosso projeto </a:t>
+              <a:t>A nossa web Application onde terá toda a conexão com o banco e que o nosso front vai consumir direto da nossa web Application, utilizamos Java, pois é uma linguagem que possui maior capacidade de adaptação em </a:t>
+            </a:r>
+            <a:r>
+              <a:rPr lang="pt-BR" sz="1632" dirty="0" err="1"/>
+              <a:t>S.Os</a:t>
+            </a:r>
+            <a:r>
+              <a:rPr lang="pt-BR" sz="1632" dirty="0"/>
+              <a:t> diferentes, sendo uma linguagem bastante difundida no atual cenário da tecnologia;</a:t>
             </a:r>
           </a:p>
           <a:p>
+            <a:pPr marL="285750" indent="-285750">
+              <a:buFont typeface="Arial" panose="020B0604020202020204" pitchFamily="34" charset="0"/>
+              <a:buChar char="•"/>
+            </a:pPr>
+            <a:endParaRPr lang="pt-BR" sz="1632" dirty="0"/>
+          </a:p>
+          <a:p>
+            <a:pPr marL="285750" indent="-285750">
+              <a:buFont typeface="Arial" panose="020B0604020202020204" pitchFamily="34" charset="0"/>
+              <a:buChar char="•"/>
+            </a:pPr>
             <a:r>
               <a:rPr lang="pt-BR" sz="1632" dirty="0"/>
-              <a:t>No nosso front, utilizaremos React, Html, Css e Js, linguagens em que os integrantes mais estão familiarizados, e pensando na escalabilidade para o próximo semestre, adicionamos um container de mobile, onde será feito em Kotlin para Android, e em paralelo fazer em React Native, onde atende Android e IOS.  </a:t>
+              <a:t>Foi utilizada arquitetura de </a:t>
             </a:r>
+            <a:r>
+              <a:rPr lang="pt-BR" sz="1632" dirty="0" err="1"/>
+              <a:t>microserviços</a:t>
+            </a:r>
+            <a:r>
+              <a:rPr lang="pt-BR" sz="1632" dirty="0"/>
+              <a:t> para garantir uma maior escalabilidade do projeto, permitindo que diversos front-</a:t>
+            </a:r>
+            <a:r>
+              <a:rPr lang="pt-BR" sz="1632" dirty="0" err="1"/>
+              <a:t>ends</a:t>
+            </a:r>
+            <a:r>
+              <a:rPr lang="pt-BR" sz="1632" dirty="0"/>
+              <a:t> em diversas </a:t>
+            </a:r>
+            <a:r>
+              <a:rPr lang="pt-BR" sz="1632"/>
+              <a:t>plataformas diferentes.</a:t>
+            </a:r>
+            <a:endParaRPr lang="pt-BR" sz="1632" dirty="0"/>
+          </a:p>
+          <a:p>
+            <a:endParaRPr lang="pt-BR" sz="1632" dirty="0"/>
+          </a:p>
+          <a:p>
+            <a:pPr marL="285750" indent="-285750">
+              <a:buFont typeface="Arial" panose="020B0604020202020204" pitchFamily="34" charset="0"/>
+              <a:buChar char="•"/>
+            </a:pPr>
+            <a:r>
+              <a:rPr lang="pt-BR" sz="1632" dirty="0"/>
+              <a:t>No nosso front, utilizaremos React, Html, Css e Js, linguagens em que os integrantes estão mais familiarizados, e pensando na escalabilidade, adicionamos um container de mobile, onde será feito em Kotlin para Android, e em paralelo fazer em React Native, onde atende Android e IOS.  </a:t>
+            </a:r>
+          </a:p>
+          <a:p>
+            <a:endParaRPr lang="pt-BR" sz="1632" dirty="0"/>
           </a:p>
         </p:txBody>
       </p:sp>

</xml_diff>

<commit_message>
ajustes diagrama de componentes
</commit_message>
<xml_diff>
--- a/Documentação/EngenhariaDeSoftware/Arquitetura/ArquiteturaSoftware.pptx
+++ b/Documentação/EngenhariaDeSoftware/Arquitetura/ArquiteturaSoftware.pptx
@@ -264,7 +264,7 @@
           <a:p>
             <a:fld id="{15C30538-17BE-4D2F-958A-9FC5875DA85F}" type="datetimeFigureOut">
               <a:rPr lang="pt-BR" smtClean="0"/>
-              <a:t>03/11/2021</a:t>
+              <a:t>16/11/2021</a:t>
             </a:fld>
             <a:endParaRPr lang="pt-BR"/>
           </a:p>
@@ -462,7 +462,7 @@
           <a:p>
             <a:fld id="{15C30538-17BE-4D2F-958A-9FC5875DA85F}" type="datetimeFigureOut">
               <a:rPr lang="pt-BR" smtClean="0"/>
-              <a:t>03/11/2021</a:t>
+              <a:t>16/11/2021</a:t>
             </a:fld>
             <a:endParaRPr lang="pt-BR"/>
           </a:p>
@@ -670,7 +670,7 @@
           <a:p>
             <a:fld id="{15C30538-17BE-4D2F-958A-9FC5875DA85F}" type="datetimeFigureOut">
               <a:rPr lang="pt-BR" smtClean="0"/>
-              <a:t>03/11/2021</a:t>
+              <a:t>16/11/2021</a:t>
             </a:fld>
             <a:endParaRPr lang="pt-BR"/>
           </a:p>
@@ -1868,7 +1868,7 @@
           <a:p>
             <a:fld id="{15C30538-17BE-4D2F-958A-9FC5875DA85F}" type="datetimeFigureOut">
               <a:rPr lang="pt-BR" smtClean="0"/>
-              <a:t>03/11/2021</a:t>
+              <a:t>16/11/2021</a:t>
             </a:fld>
             <a:endParaRPr lang="pt-BR"/>
           </a:p>
@@ -2143,7 +2143,7 @@
           <a:p>
             <a:fld id="{15C30538-17BE-4D2F-958A-9FC5875DA85F}" type="datetimeFigureOut">
               <a:rPr lang="pt-BR" smtClean="0"/>
-              <a:t>03/11/2021</a:t>
+              <a:t>16/11/2021</a:t>
             </a:fld>
             <a:endParaRPr lang="pt-BR"/>
           </a:p>
@@ -2408,7 +2408,7 @@
           <a:p>
             <a:fld id="{15C30538-17BE-4D2F-958A-9FC5875DA85F}" type="datetimeFigureOut">
               <a:rPr lang="pt-BR" smtClean="0"/>
-              <a:t>03/11/2021</a:t>
+              <a:t>16/11/2021</a:t>
             </a:fld>
             <a:endParaRPr lang="pt-BR"/>
           </a:p>
@@ -2820,7 +2820,7 @@
           <a:p>
             <a:fld id="{15C30538-17BE-4D2F-958A-9FC5875DA85F}" type="datetimeFigureOut">
               <a:rPr lang="pt-BR" smtClean="0"/>
-              <a:t>03/11/2021</a:t>
+              <a:t>16/11/2021</a:t>
             </a:fld>
             <a:endParaRPr lang="pt-BR"/>
           </a:p>
@@ -2961,7 +2961,7 @@
           <a:p>
             <a:fld id="{15C30538-17BE-4D2F-958A-9FC5875DA85F}" type="datetimeFigureOut">
               <a:rPr lang="pt-BR" smtClean="0"/>
-              <a:t>03/11/2021</a:t>
+              <a:t>16/11/2021</a:t>
             </a:fld>
             <a:endParaRPr lang="pt-BR"/>
           </a:p>
@@ -3074,7 +3074,7 @@
           <a:p>
             <a:fld id="{15C30538-17BE-4D2F-958A-9FC5875DA85F}" type="datetimeFigureOut">
               <a:rPr lang="pt-BR" smtClean="0"/>
-              <a:t>03/11/2021</a:t>
+              <a:t>16/11/2021</a:t>
             </a:fld>
             <a:endParaRPr lang="pt-BR"/>
           </a:p>
@@ -3385,7 +3385,7 @@
           <a:p>
             <a:fld id="{15C30538-17BE-4D2F-958A-9FC5875DA85F}" type="datetimeFigureOut">
               <a:rPr lang="pt-BR" smtClean="0"/>
-              <a:t>03/11/2021</a:t>
+              <a:t>16/11/2021</a:t>
             </a:fld>
             <a:endParaRPr lang="pt-BR"/>
           </a:p>
@@ -3673,7 +3673,7 @@
           <a:p>
             <a:fld id="{15C30538-17BE-4D2F-958A-9FC5875DA85F}" type="datetimeFigureOut">
               <a:rPr lang="pt-BR" smtClean="0"/>
-              <a:t>03/11/2021</a:t>
+              <a:t>16/11/2021</a:t>
             </a:fld>
             <a:endParaRPr lang="pt-BR"/>
           </a:p>
@@ -3914,7 +3914,7 @@
           <a:p>
             <a:fld id="{15C30538-17BE-4D2F-958A-9FC5875DA85F}" type="datetimeFigureOut">
               <a:rPr lang="pt-BR" smtClean="0"/>
-              <a:t>03/11/2021</a:t>
+              <a:t>16/11/2021</a:t>
             </a:fld>
             <a:endParaRPr lang="pt-BR"/>
           </a:p>
@@ -4409,7 +4409,7 @@
         </p:nvSpPr>
         <p:spPr>
           <a:xfrm>
-            <a:off x="2760479" y="662498"/>
+            <a:off x="2066740" y="675750"/>
             <a:ext cx="2131712" cy="2155138"/>
           </a:xfrm>
           <a:prstGeom prst="flowChartMagneticDisk">
@@ -4470,7 +4470,7 @@
         </p:nvSpPr>
         <p:spPr>
           <a:xfrm>
-            <a:off x="2694081" y="1344204"/>
+            <a:off x="2000342" y="1357456"/>
             <a:ext cx="2229672" cy="1264577"/>
           </a:xfrm>
           <a:prstGeom prst="rect">
@@ -4539,7 +4539,7 @@
         </p:nvCxnSpPr>
         <p:spPr>
           <a:xfrm flipH="1">
-            <a:off x="4903495" y="1765565"/>
+            <a:off x="4209756" y="1778817"/>
             <a:ext cx="2812146" cy="652"/>
           </a:xfrm>
           <a:prstGeom prst="straightConnector1">
@@ -4585,7 +4585,7 @@
         </p:nvGrpSpPr>
         <p:grpSpPr>
           <a:xfrm>
-            <a:off x="5372898" y="3966851"/>
+            <a:off x="4679159" y="3980103"/>
             <a:ext cx="2654509" cy="2064386"/>
             <a:chOff x="7014179" y="4670692"/>
             <a:chExt cx="2582692" cy="2036806"/>
@@ -4965,7 +4965,7 @@
         </p:nvCxnSpPr>
         <p:spPr>
           <a:xfrm flipV="1">
-            <a:off x="6708496" y="2636228"/>
+            <a:off x="6014757" y="2649480"/>
             <a:ext cx="1056933" cy="1330623"/>
           </a:xfrm>
           <a:prstGeom prst="straightConnector1">
@@ -5111,7 +5111,7 @@
         </p:nvSpPr>
         <p:spPr>
           <a:xfrm>
-            <a:off x="1216810" y="3956180"/>
+            <a:off x="523071" y="3969432"/>
             <a:ext cx="2156068" cy="1828601"/>
           </a:xfrm>
           <a:prstGeom prst="rect">
@@ -5173,7 +5173,7 @@
         </p:nvSpPr>
         <p:spPr>
           <a:xfrm>
-            <a:off x="1124881" y="4067792"/>
+            <a:off x="431142" y="4081044"/>
             <a:ext cx="2327633" cy="818044"/>
           </a:xfrm>
           <a:prstGeom prst="rect">
@@ -5219,7 +5219,7 @@
         </p:nvSpPr>
         <p:spPr>
           <a:xfrm>
-            <a:off x="1261447" y="4825309"/>
+            <a:off x="567708" y="4838561"/>
             <a:ext cx="2054502" cy="985398"/>
           </a:xfrm>
           <a:prstGeom prst="rect">
@@ -5257,7 +5257,7 @@
         </p:nvGrpSpPr>
         <p:grpSpPr>
           <a:xfrm>
-            <a:off x="8333840" y="3966850"/>
+            <a:off x="7640101" y="3980102"/>
             <a:ext cx="2086794" cy="2043526"/>
             <a:chOff x="6913080" y="4670692"/>
             <a:chExt cx="2759745" cy="2016225"/>
@@ -5633,7 +5633,7 @@
         </p:nvCxnSpPr>
         <p:spPr>
           <a:xfrm flipV="1">
-            <a:off x="9183591" y="2679866"/>
+            <a:off x="8489852" y="2693118"/>
             <a:ext cx="0" cy="1273413"/>
           </a:xfrm>
           <a:prstGeom prst="straightConnector1">
@@ -5681,7 +5681,7 @@
         </p:nvCxnSpPr>
         <p:spPr>
           <a:xfrm flipH="1" flipV="1">
-            <a:off x="3353129" y="4855246"/>
+            <a:off x="2659390" y="4868498"/>
             <a:ext cx="2116090" cy="11783"/>
           </a:xfrm>
           <a:prstGeom prst="straightConnector1">
@@ -5727,7 +5727,7 @@
         </p:nvGrpSpPr>
         <p:grpSpPr>
           <a:xfrm>
-            <a:off x="7604006" y="655988"/>
+            <a:off x="6910267" y="669240"/>
             <a:ext cx="2566458" cy="2016224"/>
             <a:chOff x="8741678" y="1501253"/>
             <a:chExt cx="2566458" cy="2016224"/>
@@ -6168,6 +6168,515 @@
           </p:txBody>
         </p:sp>
       </p:grpSp>
+      <p:grpSp>
+        <p:nvGrpSpPr>
+          <p:cNvPr id="40" name="Group 79">
+            <a:extLst>
+              <a:ext uri="{FF2B5EF4-FFF2-40B4-BE49-F238E27FC236}">
+                <a16:creationId xmlns:a16="http://schemas.microsoft.com/office/drawing/2014/main" id="{5ECE997B-4E2A-4006-902F-273C8E669C24}"/>
+              </a:ext>
+            </a:extLst>
+          </p:cNvPr>
+          <p:cNvGrpSpPr/>
+          <p:nvPr/>
+        </p:nvGrpSpPr>
+        <p:grpSpPr>
+          <a:xfrm>
+            <a:off x="9916301" y="1163767"/>
+            <a:ext cx="2240677" cy="1469214"/>
+            <a:chOff x="3170272" y="4675508"/>
+            <a:chExt cx="2987399" cy="2073049"/>
+          </a:xfrm>
+        </p:grpSpPr>
+        <p:sp>
+          <p:nvSpPr>
+            <p:cNvPr id="49" name="Retângulo 48">
+              <a:extLst>
+                <a:ext uri="{FF2B5EF4-FFF2-40B4-BE49-F238E27FC236}">
+                  <a16:creationId xmlns:a16="http://schemas.microsoft.com/office/drawing/2014/main" id="{E00E5372-C0A4-4247-97A0-6E419D399FA1}"/>
+                </a:ext>
+              </a:extLst>
+            </p:cNvPr>
+            <p:cNvSpPr/>
+            <p:nvPr/>
+          </p:nvSpPr>
+          <p:spPr>
+            <a:xfrm>
+              <a:off x="3300905" y="4699652"/>
+              <a:ext cx="2710474" cy="2016223"/>
+            </a:xfrm>
+            <a:prstGeom prst="rect">
+              <a:avLst/>
+            </a:prstGeom>
+            <a:solidFill>
+              <a:srgbClr val="32B9CD"/>
+            </a:solidFill>
+            <a:ln>
+              <a:solidFill>
+                <a:schemeClr val="accent5">
+                  <a:lumMod val="75000"/>
+                </a:schemeClr>
+              </a:solidFill>
+            </a:ln>
+          </p:spPr>
+          <p:style>
+            <a:lnRef idx="2">
+              <a:schemeClr val="accent1">
+                <a:shade val="50000"/>
+              </a:schemeClr>
+            </a:lnRef>
+            <a:fillRef idx="1">
+              <a:schemeClr val="accent1"/>
+            </a:fillRef>
+            <a:effectRef idx="0">
+              <a:schemeClr val="accent1"/>
+            </a:effectRef>
+            <a:fontRef idx="minor">
+              <a:schemeClr val="lt1"/>
+            </a:fontRef>
+          </p:style>
+          <p:txBody>
+            <a:bodyPr rtlCol="0" anchor="ctr"/>
+            <a:lstStyle>
+              <a:defPPr>
+                <a:defRPr lang="pt-BR"/>
+              </a:defPPr>
+              <a:lvl1pPr marL="0" algn="l" defTabSz="1043056" rtl="0" eaLnBrk="1" latinLnBrk="0" hangingPunct="1">
+                <a:defRPr sz="2100" kern="1200">
+                  <a:solidFill>
+                    <a:schemeClr val="lt1"/>
+                  </a:solidFill>
+                  <a:latin typeface="+mn-lt"/>
+                  <a:ea typeface="+mn-ea"/>
+                  <a:cs typeface="+mn-cs"/>
+                </a:defRPr>
+              </a:lvl1pPr>
+              <a:lvl2pPr marL="521528" algn="l" defTabSz="1043056" rtl="0" eaLnBrk="1" latinLnBrk="0" hangingPunct="1">
+                <a:defRPr sz="2100" kern="1200">
+                  <a:solidFill>
+                    <a:schemeClr val="lt1"/>
+                  </a:solidFill>
+                  <a:latin typeface="+mn-lt"/>
+                  <a:ea typeface="+mn-ea"/>
+                  <a:cs typeface="+mn-cs"/>
+                </a:defRPr>
+              </a:lvl2pPr>
+              <a:lvl3pPr marL="1043056" algn="l" defTabSz="1043056" rtl="0" eaLnBrk="1" latinLnBrk="0" hangingPunct="1">
+                <a:defRPr sz="2100" kern="1200">
+                  <a:solidFill>
+                    <a:schemeClr val="lt1"/>
+                  </a:solidFill>
+                  <a:latin typeface="+mn-lt"/>
+                  <a:ea typeface="+mn-ea"/>
+                  <a:cs typeface="+mn-cs"/>
+                </a:defRPr>
+              </a:lvl3pPr>
+              <a:lvl4pPr marL="1564584" algn="l" defTabSz="1043056" rtl="0" eaLnBrk="1" latinLnBrk="0" hangingPunct="1">
+                <a:defRPr sz="2100" kern="1200">
+                  <a:solidFill>
+                    <a:schemeClr val="lt1"/>
+                  </a:solidFill>
+                  <a:latin typeface="+mn-lt"/>
+                  <a:ea typeface="+mn-ea"/>
+                  <a:cs typeface="+mn-cs"/>
+                </a:defRPr>
+              </a:lvl4pPr>
+              <a:lvl5pPr marL="2086112" algn="l" defTabSz="1043056" rtl="0" eaLnBrk="1" latinLnBrk="0" hangingPunct="1">
+                <a:defRPr sz="2100" kern="1200">
+                  <a:solidFill>
+                    <a:schemeClr val="lt1"/>
+                  </a:solidFill>
+                  <a:latin typeface="+mn-lt"/>
+                  <a:ea typeface="+mn-ea"/>
+                  <a:cs typeface="+mn-cs"/>
+                </a:defRPr>
+              </a:lvl5pPr>
+              <a:lvl6pPr marL="2607640" algn="l" defTabSz="1043056" rtl="0" eaLnBrk="1" latinLnBrk="0" hangingPunct="1">
+                <a:defRPr sz="2100" kern="1200">
+                  <a:solidFill>
+                    <a:schemeClr val="lt1"/>
+                  </a:solidFill>
+                  <a:latin typeface="+mn-lt"/>
+                  <a:ea typeface="+mn-ea"/>
+                  <a:cs typeface="+mn-cs"/>
+                </a:defRPr>
+              </a:lvl6pPr>
+              <a:lvl7pPr marL="3129168" algn="l" defTabSz="1043056" rtl="0" eaLnBrk="1" latinLnBrk="0" hangingPunct="1">
+                <a:defRPr sz="2100" kern="1200">
+                  <a:solidFill>
+                    <a:schemeClr val="lt1"/>
+                  </a:solidFill>
+                  <a:latin typeface="+mn-lt"/>
+                  <a:ea typeface="+mn-ea"/>
+                  <a:cs typeface="+mn-cs"/>
+                </a:defRPr>
+              </a:lvl7pPr>
+              <a:lvl8pPr marL="3650696" algn="l" defTabSz="1043056" rtl="0" eaLnBrk="1" latinLnBrk="0" hangingPunct="1">
+                <a:defRPr sz="2100" kern="1200">
+                  <a:solidFill>
+                    <a:schemeClr val="lt1"/>
+                  </a:solidFill>
+                  <a:latin typeface="+mn-lt"/>
+                  <a:ea typeface="+mn-ea"/>
+                  <a:cs typeface="+mn-cs"/>
+                </a:defRPr>
+              </a:lvl8pPr>
+              <a:lvl9pPr marL="4172224" algn="l" defTabSz="1043056" rtl="0" eaLnBrk="1" latinLnBrk="0" hangingPunct="1">
+                <a:defRPr sz="2100" kern="1200">
+                  <a:solidFill>
+                    <a:schemeClr val="lt1"/>
+                  </a:solidFill>
+                  <a:latin typeface="+mn-lt"/>
+                  <a:ea typeface="+mn-ea"/>
+                  <a:cs typeface="+mn-cs"/>
+                </a:defRPr>
+              </a:lvl9pPr>
+            </a:lstStyle>
+            <a:p>
+              <a:pPr algn="ctr"/>
+              <a:endParaRPr lang="pt-BR" sz="2000" dirty="0">
+                <a:solidFill>
+                  <a:prstClr val="white"/>
+                </a:solidFill>
+                <a:latin typeface="Calibri"/>
+              </a:endParaRPr>
+            </a:p>
+          </p:txBody>
+        </p:sp>
+        <p:sp>
+          <p:nvSpPr>
+            <p:cNvPr id="50" name="Retângulo 49">
+              <a:extLst>
+                <a:ext uri="{FF2B5EF4-FFF2-40B4-BE49-F238E27FC236}">
+                  <a16:creationId xmlns:a16="http://schemas.microsoft.com/office/drawing/2014/main" id="{B9CAAA6D-6544-4DC6-AD6C-BF069DE382EC}"/>
+                </a:ext>
+              </a:extLst>
+            </p:cNvPr>
+            <p:cNvSpPr/>
+            <p:nvPr/>
+          </p:nvSpPr>
+          <p:spPr>
+            <a:xfrm>
+              <a:off x="3475641" y="5706308"/>
+              <a:ext cx="2360997" cy="1042249"/>
+            </a:xfrm>
+            <a:prstGeom prst="rect">
+              <a:avLst/>
+            </a:prstGeom>
+          </p:spPr>
+          <p:txBody>
+            <a:bodyPr wrap="square">
+              <a:spAutoFit/>
+            </a:bodyPr>
+            <a:lstStyle>
+              <a:defPPr>
+                <a:defRPr lang="pt-BR"/>
+              </a:defPPr>
+              <a:lvl1pPr marL="0" algn="l" defTabSz="1043056" rtl="0" eaLnBrk="1" latinLnBrk="0" hangingPunct="1">
+                <a:defRPr sz="2100" kern="1200">
+                  <a:solidFill>
+                    <a:schemeClr val="tx1"/>
+                  </a:solidFill>
+                  <a:latin typeface="+mn-lt"/>
+                  <a:ea typeface="+mn-ea"/>
+                  <a:cs typeface="+mn-cs"/>
+                </a:defRPr>
+              </a:lvl1pPr>
+              <a:lvl2pPr marL="521528" algn="l" defTabSz="1043056" rtl="0" eaLnBrk="1" latinLnBrk="0" hangingPunct="1">
+                <a:defRPr sz="2100" kern="1200">
+                  <a:solidFill>
+                    <a:schemeClr val="tx1"/>
+                  </a:solidFill>
+                  <a:latin typeface="+mn-lt"/>
+                  <a:ea typeface="+mn-ea"/>
+                  <a:cs typeface="+mn-cs"/>
+                </a:defRPr>
+              </a:lvl2pPr>
+              <a:lvl3pPr marL="1043056" algn="l" defTabSz="1043056" rtl="0" eaLnBrk="1" latinLnBrk="0" hangingPunct="1">
+                <a:defRPr sz="2100" kern="1200">
+                  <a:solidFill>
+                    <a:schemeClr val="tx1"/>
+                  </a:solidFill>
+                  <a:latin typeface="+mn-lt"/>
+                  <a:ea typeface="+mn-ea"/>
+                  <a:cs typeface="+mn-cs"/>
+                </a:defRPr>
+              </a:lvl3pPr>
+              <a:lvl4pPr marL="1564584" algn="l" defTabSz="1043056" rtl="0" eaLnBrk="1" latinLnBrk="0" hangingPunct="1">
+                <a:defRPr sz="2100" kern="1200">
+                  <a:solidFill>
+                    <a:schemeClr val="tx1"/>
+                  </a:solidFill>
+                  <a:latin typeface="+mn-lt"/>
+                  <a:ea typeface="+mn-ea"/>
+                  <a:cs typeface="+mn-cs"/>
+                </a:defRPr>
+              </a:lvl4pPr>
+              <a:lvl5pPr marL="2086112" algn="l" defTabSz="1043056" rtl="0" eaLnBrk="1" latinLnBrk="0" hangingPunct="1">
+                <a:defRPr sz="2100" kern="1200">
+                  <a:solidFill>
+                    <a:schemeClr val="tx1"/>
+                  </a:solidFill>
+                  <a:latin typeface="+mn-lt"/>
+                  <a:ea typeface="+mn-ea"/>
+                  <a:cs typeface="+mn-cs"/>
+                </a:defRPr>
+              </a:lvl5pPr>
+              <a:lvl6pPr marL="2607640" algn="l" defTabSz="1043056" rtl="0" eaLnBrk="1" latinLnBrk="0" hangingPunct="1">
+                <a:defRPr sz="2100" kern="1200">
+                  <a:solidFill>
+                    <a:schemeClr val="tx1"/>
+                  </a:solidFill>
+                  <a:latin typeface="+mn-lt"/>
+                  <a:ea typeface="+mn-ea"/>
+                  <a:cs typeface="+mn-cs"/>
+                </a:defRPr>
+              </a:lvl6pPr>
+              <a:lvl7pPr marL="3129168" algn="l" defTabSz="1043056" rtl="0" eaLnBrk="1" latinLnBrk="0" hangingPunct="1">
+                <a:defRPr sz="2100" kern="1200">
+                  <a:solidFill>
+                    <a:schemeClr val="tx1"/>
+                  </a:solidFill>
+                  <a:latin typeface="+mn-lt"/>
+                  <a:ea typeface="+mn-ea"/>
+                  <a:cs typeface="+mn-cs"/>
+                </a:defRPr>
+              </a:lvl7pPr>
+              <a:lvl8pPr marL="3650696" algn="l" defTabSz="1043056" rtl="0" eaLnBrk="1" latinLnBrk="0" hangingPunct="1">
+                <a:defRPr sz="2100" kern="1200">
+                  <a:solidFill>
+                    <a:schemeClr val="tx1"/>
+                  </a:solidFill>
+                  <a:latin typeface="+mn-lt"/>
+                  <a:ea typeface="+mn-ea"/>
+                  <a:cs typeface="+mn-cs"/>
+                </a:defRPr>
+              </a:lvl8pPr>
+              <a:lvl9pPr marL="4172224" algn="l" defTabSz="1043056" rtl="0" eaLnBrk="1" latinLnBrk="0" hangingPunct="1">
+                <a:defRPr sz="2100" kern="1200">
+                  <a:solidFill>
+                    <a:schemeClr val="tx1"/>
+                  </a:solidFill>
+                  <a:latin typeface="+mn-lt"/>
+                  <a:ea typeface="+mn-ea"/>
+                  <a:cs typeface="+mn-cs"/>
+                </a:defRPr>
+              </a:lvl9pPr>
+            </a:lstStyle>
+            <a:p>
+              <a:pPr lvl="0" algn="ctr">
+                <a:defRPr/>
+              </a:pPr>
+              <a:r>
+                <a:rPr lang="pt-BR" sz="1400" dirty="0">
+                  <a:solidFill>
+                    <a:prstClr val="white"/>
+                  </a:solidFill>
+                </a:rPr>
+                <a:t>Validação por e-mail do usuário ao acessar o sistema</a:t>
+              </a:r>
+            </a:p>
+          </p:txBody>
+        </p:sp>
+        <p:sp>
+          <p:nvSpPr>
+            <p:cNvPr id="51" name="Retângulo 50">
+              <a:extLst>
+                <a:ext uri="{FF2B5EF4-FFF2-40B4-BE49-F238E27FC236}">
+                  <a16:creationId xmlns:a16="http://schemas.microsoft.com/office/drawing/2014/main" id="{70FA36D2-894D-4BA1-ACB0-D26D3AAD0D0B}"/>
+                </a:ext>
+              </a:extLst>
+            </p:cNvPr>
+            <p:cNvSpPr/>
+            <p:nvPr/>
+          </p:nvSpPr>
+          <p:spPr>
+            <a:xfrm>
+              <a:off x="3170272" y="4675508"/>
+              <a:ext cx="2987399" cy="825113"/>
+            </a:xfrm>
+            <a:prstGeom prst="rect">
+              <a:avLst/>
+            </a:prstGeom>
+          </p:spPr>
+          <p:txBody>
+            <a:bodyPr wrap="square">
+              <a:spAutoFit/>
+            </a:bodyPr>
+            <a:lstStyle>
+              <a:defPPr>
+                <a:defRPr lang="pt-BR"/>
+              </a:defPPr>
+              <a:lvl1pPr marL="0" algn="l" defTabSz="1043056" rtl="0" eaLnBrk="1" latinLnBrk="0" hangingPunct="1">
+                <a:defRPr sz="2100" kern="1200">
+                  <a:solidFill>
+                    <a:schemeClr val="tx1"/>
+                  </a:solidFill>
+                  <a:latin typeface="+mn-lt"/>
+                  <a:ea typeface="+mn-ea"/>
+                  <a:cs typeface="+mn-cs"/>
+                </a:defRPr>
+              </a:lvl1pPr>
+              <a:lvl2pPr marL="521528" algn="l" defTabSz="1043056" rtl="0" eaLnBrk="1" latinLnBrk="0" hangingPunct="1">
+                <a:defRPr sz="2100" kern="1200">
+                  <a:solidFill>
+                    <a:schemeClr val="tx1"/>
+                  </a:solidFill>
+                  <a:latin typeface="+mn-lt"/>
+                  <a:ea typeface="+mn-ea"/>
+                  <a:cs typeface="+mn-cs"/>
+                </a:defRPr>
+              </a:lvl2pPr>
+              <a:lvl3pPr marL="1043056" algn="l" defTabSz="1043056" rtl="0" eaLnBrk="1" latinLnBrk="0" hangingPunct="1">
+                <a:defRPr sz="2100" kern="1200">
+                  <a:solidFill>
+                    <a:schemeClr val="tx1"/>
+                  </a:solidFill>
+                  <a:latin typeface="+mn-lt"/>
+                  <a:ea typeface="+mn-ea"/>
+                  <a:cs typeface="+mn-cs"/>
+                </a:defRPr>
+              </a:lvl3pPr>
+              <a:lvl4pPr marL="1564584" algn="l" defTabSz="1043056" rtl="0" eaLnBrk="1" latinLnBrk="0" hangingPunct="1">
+                <a:defRPr sz="2100" kern="1200">
+                  <a:solidFill>
+                    <a:schemeClr val="tx1"/>
+                  </a:solidFill>
+                  <a:latin typeface="+mn-lt"/>
+                  <a:ea typeface="+mn-ea"/>
+                  <a:cs typeface="+mn-cs"/>
+                </a:defRPr>
+              </a:lvl4pPr>
+              <a:lvl5pPr marL="2086112" algn="l" defTabSz="1043056" rtl="0" eaLnBrk="1" latinLnBrk="0" hangingPunct="1">
+                <a:defRPr sz="2100" kern="1200">
+                  <a:solidFill>
+                    <a:schemeClr val="tx1"/>
+                  </a:solidFill>
+                  <a:latin typeface="+mn-lt"/>
+                  <a:ea typeface="+mn-ea"/>
+                  <a:cs typeface="+mn-cs"/>
+                </a:defRPr>
+              </a:lvl5pPr>
+              <a:lvl6pPr marL="2607640" algn="l" defTabSz="1043056" rtl="0" eaLnBrk="1" latinLnBrk="0" hangingPunct="1">
+                <a:defRPr sz="2100" kern="1200">
+                  <a:solidFill>
+                    <a:schemeClr val="tx1"/>
+                  </a:solidFill>
+                  <a:latin typeface="+mn-lt"/>
+                  <a:ea typeface="+mn-ea"/>
+                  <a:cs typeface="+mn-cs"/>
+                </a:defRPr>
+              </a:lvl6pPr>
+              <a:lvl7pPr marL="3129168" algn="l" defTabSz="1043056" rtl="0" eaLnBrk="1" latinLnBrk="0" hangingPunct="1">
+                <a:defRPr sz="2100" kern="1200">
+                  <a:solidFill>
+                    <a:schemeClr val="tx1"/>
+                  </a:solidFill>
+                  <a:latin typeface="+mn-lt"/>
+                  <a:ea typeface="+mn-ea"/>
+                  <a:cs typeface="+mn-cs"/>
+                </a:defRPr>
+              </a:lvl7pPr>
+              <a:lvl8pPr marL="3650696" algn="l" defTabSz="1043056" rtl="0" eaLnBrk="1" latinLnBrk="0" hangingPunct="1">
+                <a:defRPr sz="2100" kern="1200">
+                  <a:solidFill>
+                    <a:schemeClr val="tx1"/>
+                  </a:solidFill>
+                  <a:latin typeface="+mn-lt"/>
+                  <a:ea typeface="+mn-ea"/>
+                  <a:cs typeface="+mn-cs"/>
+                </a:defRPr>
+              </a:lvl8pPr>
+              <a:lvl9pPr marL="4172224" algn="l" defTabSz="1043056" rtl="0" eaLnBrk="1" latinLnBrk="0" hangingPunct="1">
+                <a:defRPr sz="2100" kern="1200">
+                  <a:solidFill>
+                    <a:schemeClr val="tx1"/>
+                  </a:solidFill>
+                  <a:latin typeface="+mn-lt"/>
+                  <a:ea typeface="+mn-ea"/>
+                  <a:cs typeface="+mn-cs"/>
+                </a:defRPr>
+              </a:lvl9pPr>
+            </a:lstStyle>
+            <a:p>
+              <a:pPr lvl="0" algn="ctr">
+                <a:defRPr/>
+              </a:pPr>
+              <a:r>
+                <a:rPr lang="pt-BR" sz="1800" b="1" dirty="0">
+                  <a:solidFill>
+                    <a:prstClr val="white"/>
+                  </a:solidFill>
+                </a:rPr>
+                <a:t>Segurança</a:t>
+              </a:r>
+            </a:p>
+            <a:p>
+              <a:pPr lvl="0" algn="ctr">
+                <a:defRPr/>
+              </a:pPr>
+              <a:r>
+                <a:rPr lang="pt-BR" sz="1400" dirty="0">
+                  <a:solidFill>
+                    <a:prstClr val="white"/>
+                  </a:solidFill>
+                </a:rPr>
+                <a:t>[Container: Phyton Service]</a:t>
+              </a:r>
+            </a:p>
+          </p:txBody>
+        </p:sp>
+      </p:grpSp>
+      <p:cxnSp>
+        <p:nvCxnSpPr>
+          <p:cNvPr id="52" name="Conector de Seta Reta 107">
+            <a:extLst>
+              <a:ext uri="{FF2B5EF4-FFF2-40B4-BE49-F238E27FC236}">
+                <a16:creationId xmlns:a16="http://schemas.microsoft.com/office/drawing/2014/main" id="{C74A4B8C-0218-4F6F-B0CC-B654ACC343ED}"/>
+              </a:ext>
+            </a:extLst>
+          </p:cNvPr>
+          <p:cNvCxnSpPr>
+            <a:cxnSpLocks/>
+            <a:stCxn id="58" idx="3"/>
+            <a:endCxn id="49" idx="1"/>
+          </p:cNvCxnSpPr>
+          <p:nvPr/>
+        </p:nvCxnSpPr>
+        <p:spPr>
+          <a:xfrm flipV="1">
+            <a:off x="9400279" y="1895348"/>
+            <a:ext cx="614002" cy="4812"/>
+          </a:xfrm>
+          <a:prstGeom prst="straightConnector1">
+            <a:avLst/>
+          </a:prstGeom>
+          <a:ln w="19050">
+            <a:solidFill>
+              <a:schemeClr val="accent5">
+                <a:lumMod val="75000"/>
+              </a:schemeClr>
+            </a:solidFill>
+            <a:prstDash val="sysDash"/>
+            <a:headEnd type="none" w="lg" len="lg"/>
+            <a:tailEnd type="triangle" w="lg" len="lg"/>
+          </a:ln>
+        </p:spPr>
+        <p:style>
+          <a:lnRef idx="1">
+            <a:schemeClr val="accent1"/>
+          </a:lnRef>
+          <a:fillRef idx="0">
+            <a:schemeClr val="accent1"/>
+          </a:fillRef>
+          <a:effectRef idx="0">
+            <a:schemeClr val="accent1"/>
+          </a:effectRef>
+          <a:fontRef idx="minor">
+            <a:schemeClr val="tx1"/>
+          </a:fontRef>
+        </p:style>
+      </p:cxnSp>
     </p:spTree>
     <p:extLst>
       <p:ext uri="{BB962C8B-B14F-4D97-AF65-F5344CB8AC3E}">
@@ -6387,6 +6896,33 @@
                                   </p:childTnLst>
                                 </p:cTn>
                               </p:par>
+                              <p:par>
+                                <p:cTn id="19" presetID="1" presetClass="entr" presetSubtype="0" fill="hold" nodeType="withEffect">
+                                  <p:stCondLst>
+                                    <p:cond delay="0"/>
+                                  </p:stCondLst>
+                                  <p:childTnLst>
+                                    <p:set>
+                                      <p:cBhvr>
+                                        <p:cTn id="20" dur="1" fill="hold">
+                                          <p:stCondLst>
+                                            <p:cond delay="0"/>
+                                          </p:stCondLst>
+                                        </p:cTn>
+                                        <p:tgtEl>
+                                          <p:spTgt spid="52"/>
+                                        </p:tgtEl>
+                                        <p:attrNameLst>
+                                          <p:attrName>style.visibility</p:attrName>
+                                        </p:attrNameLst>
+                                      </p:cBhvr>
+                                      <p:to>
+                                        <p:strVal val="visible"/>
+                                      </p:to>
+                                    </p:set>
+                                  </p:childTnLst>
+                                </p:cTn>
+                              </p:par>
                             </p:childTnLst>
                           </p:cTn>
                         </p:par>
@@ -6687,7 +7223,7 @@
         </p:nvSpPr>
         <p:spPr>
           <a:xfrm>
-            <a:off x="2760479" y="662498"/>
+            <a:off x="1895546" y="662498"/>
             <a:ext cx="2131712" cy="2155138"/>
           </a:xfrm>
           <a:prstGeom prst="flowChartMagneticDisk">
@@ -6748,7 +7284,7 @@
         </p:nvSpPr>
         <p:spPr>
           <a:xfrm>
-            <a:off x="2694081" y="1344204"/>
+            <a:off x="1829148" y="1344204"/>
             <a:ext cx="2229672" cy="1264577"/>
           </a:xfrm>
           <a:prstGeom prst="rect">
@@ -6815,7 +7351,7 @@
         </p:nvGrpSpPr>
         <p:grpSpPr>
           <a:xfrm>
-            <a:off x="5372898" y="3966851"/>
+            <a:off x="4507965" y="3966851"/>
             <a:ext cx="2654509" cy="2064386"/>
             <a:chOff x="7014179" y="4670692"/>
             <a:chExt cx="2582692" cy="2036806"/>
@@ -7192,7 +7728,7 @@
         </p:nvGrpSpPr>
         <p:grpSpPr>
           <a:xfrm>
-            <a:off x="8333840" y="3966850"/>
+            <a:off x="7468907" y="3966850"/>
             <a:ext cx="2086794" cy="2043526"/>
             <a:chOff x="6913080" y="4670692"/>
             <a:chExt cx="2759745" cy="2016225"/>
@@ -7568,7 +8104,7 @@
         </p:nvCxnSpPr>
         <p:spPr>
           <a:xfrm flipH="1" flipV="1">
-            <a:off x="3353129" y="4855246"/>
+            <a:off x="2488196" y="4855246"/>
             <a:ext cx="2116090" cy="11783"/>
           </a:xfrm>
           <a:prstGeom prst="straightConnector1">
@@ -7614,7 +8150,7 @@
         </p:nvSpPr>
         <p:spPr>
           <a:xfrm>
-            <a:off x="5254100" y="662498"/>
+            <a:off x="4389167" y="662498"/>
             <a:ext cx="5440570" cy="5901412"/>
           </a:xfrm>
           <a:prstGeom prst="rect">
@@ -7805,7 +8341,7 @@
         </p:nvGrpSpPr>
         <p:grpSpPr>
           <a:xfrm>
-            <a:off x="7642086" y="815775"/>
+            <a:off x="6777153" y="815775"/>
             <a:ext cx="2566458" cy="2016224"/>
             <a:chOff x="8741678" y="1501253"/>
             <a:chExt cx="2566458" cy="2016224"/>
@@ -8429,7 +8965,7 @@
         </p:nvSpPr>
         <p:spPr>
           <a:xfrm>
-            <a:off x="1216810" y="3956180"/>
+            <a:off x="351877" y="3956180"/>
             <a:ext cx="2156068" cy="1828601"/>
           </a:xfrm>
           <a:prstGeom prst="rect">
@@ -8491,7 +9027,7 @@
         </p:nvSpPr>
         <p:spPr>
           <a:xfrm>
-            <a:off x="1124881" y="4067792"/>
+            <a:off x="259948" y="4067792"/>
             <a:ext cx="2327633" cy="818044"/>
           </a:xfrm>
           <a:prstGeom prst="rect">
@@ -8537,7 +9073,7 @@
         </p:nvSpPr>
         <p:spPr>
           <a:xfrm>
-            <a:off x="1261447" y="4825309"/>
+            <a:off x="396514" y="4825309"/>
             <a:ext cx="2054502" cy="985398"/>
           </a:xfrm>
           <a:prstGeom prst="rect">
@@ -8577,7 +9113,7 @@
         </p:nvCxnSpPr>
         <p:spPr>
           <a:xfrm flipH="1">
-            <a:off x="4903495" y="1765565"/>
+            <a:off x="4038562" y="1765565"/>
             <a:ext cx="2812146" cy="652"/>
           </a:xfrm>
           <a:prstGeom prst="straightConnector1">
@@ -8625,7 +9161,7 @@
         </p:nvCxnSpPr>
         <p:spPr>
           <a:xfrm flipV="1">
-            <a:off x="6708495" y="2831999"/>
+            <a:off x="5843562" y="2831999"/>
             <a:ext cx="1056934" cy="1134851"/>
           </a:xfrm>
           <a:prstGeom prst="straightConnector1">
@@ -8673,8 +9209,516 @@
         </p:nvCxnSpPr>
         <p:spPr>
           <a:xfrm flipV="1">
-            <a:off x="9183591" y="2831999"/>
+            <a:off x="8318658" y="2831999"/>
             <a:ext cx="0" cy="1121281"/>
+          </a:xfrm>
+          <a:prstGeom prst="straightConnector1">
+            <a:avLst/>
+          </a:prstGeom>
+          <a:ln w="19050">
+            <a:solidFill>
+              <a:schemeClr val="accent5">
+                <a:lumMod val="75000"/>
+              </a:schemeClr>
+            </a:solidFill>
+            <a:prstDash val="sysDash"/>
+            <a:headEnd type="none" w="lg" len="lg"/>
+            <a:tailEnd type="triangle" w="lg" len="lg"/>
+          </a:ln>
+        </p:spPr>
+        <p:style>
+          <a:lnRef idx="1">
+            <a:schemeClr val="accent1"/>
+          </a:lnRef>
+          <a:fillRef idx="0">
+            <a:schemeClr val="accent1"/>
+          </a:fillRef>
+          <a:effectRef idx="0">
+            <a:schemeClr val="accent1"/>
+          </a:effectRef>
+          <a:fontRef idx="minor">
+            <a:schemeClr val="tx1"/>
+          </a:fontRef>
+        </p:style>
+      </p:cxnSp>
+      <p:grpSp>
+        <p:nvGrpSpPr>
+          <p:cNvPr id="36" name="Group 79">
+            <a:extLst>
+              <a:ext uri="{FF2B5EF4-FFF2-40B4-BE49-F238E27FC236}">
+                <a16:creationId xmlns:a16="http://schemas.microsoft.com/office/drawing/2014/main" id="{70C780FF-D093-43FF-B9E7-D7B1B5559F7E}"/>
+              </a:ext>
+            </a:extLst>
+          </p:cNvPr>
+          <p:cNvGrpSpPr/>
+          <p:nvPr/>
+        </p:nvGrpSpPr>
+        <p:grpSpPr>
+          <a:xfrm>
+            <a:off x="9916301" y="1163767"/>
+            <a:ext cx="2240677" cy="1469214"/>
+            <a:chOff x="3170272" y="4675508"/>
+            <a:chExt cx="2987399" cy="2073049"/>
+          </a:xfrm>
+        </p:grpSpPr>
+        <p:sp>
+          <p:nvSpPr>
+            <p:cNvPr id="37" name="Retângulo 36">
+              <a:extLst>
+                <a:ext uri="{FF2B5EF4-FFF2-40B4-BE49-F238E27FC236}">
+                  <a16:creationId xmlns:a16="http://schemas.microsoft.com/office/drawing/2014/main" id="{65F427D4-AA56-4DCE-A07B-946C0CAFD425}"/>
+                </a:ext>
+              </a:extLst>
+            </p:cNvPr>
+            <p:cNvSpPr/>
+            <p:nvPr/>
+          </p:nvSpPr>
+          <p:spPr>
+            <a:xfrm>
+              <a:off x="3300905" y="4699652"/>
+              <a:ext cx="2710474" cy="2016223"/>
+            </a:xfrm>
+            <a:prstGeom prst="rect">
+              <a:avLst/>
+            </a:prstGeom>
+            <a:solidFill>
+              <a:srgbClr val="32B9CD"/>
+            </a:solidFill>
+            <a:ln>
+              <a:solidFill>
+                <a:schemeClr val="accent5">
+                  <a:lumMod val="75000"/>
+                </a:schemeClr>
+              </a:solidFill>
+            </a:ln>
+          </p:spPr>
+          <p:style>
+            <a:lnRef idx="2">
+              <a:schemeClr val="accent1">
+                <a:shade val="50000"/>
+              </a:schemeClr>
+            </a:lnRef>
+            <a:fillRef idx="1">
+              <a:schemeClr val="accent1"/>
+            </a:fillRef>
+            <a:effectRef idx="0">
+              <a:schemeClr val="accent1"/>
+            </a:effectRef>
+            <a:fontRef idx="minor">
+              <a:schemeClr val="lt1"/>
+            </a:fontRef>
+          </p:style>
+          <p:txBody>
+            <a:bodyPr rtlCol="0" anchor="ctr"/>
+            <a:lstStyle>
+              <a:defPPr>
+                <a:defRPr lang="pt-BR"/>
+              </a:defPPr>
+              <a:lvl1pPr marL="0" algn="l" defTabSz="1043056" rtl="0" eaLnBrk="1" latinLnBrk="0" hangingPunct="1">
+                <a:defRPr sz="2100" kern="1200">
+                  <a:solidFill>
+                    <a:schemeClr val="lt1"/>
+                  </a:solidFill>
+                  <a:latin typeface="+mn-lt"/>
+                  <a:ea typeface="+mn-ea"/>
+                  <a:cs typeface="+mn-cs"/>
+                </a:defRPr>
+              </a:lvl1pPr>
+              <a:lvl2pPr marL="521528" algn="l" defTabSz="1043056" rtl="0" eaLnBrk="1" latinLnBrk="0" hangingPunct="1">
+                <a:defRPr sz="2100" kern="1200">
+                  <a:solidFill>
+                    <a:schemeClr val="lt1"/>
+                  </a:solidFill>
+                  <a:latin typeface="+mn-lt"/>
+                  <a:ea typeface="+mn-ea"/>
+                  <a:cs typeface="+mn-cs"/>
+                </a:defRPr>
+              </a:lvl2pPr>
+              <a:lvl3pPr marL="1043056" algn="l" defTabSz="1043056" rtl="0" eaLnBrk="1" latinLnBrk="0" hangingPunct="1">
+                <a:defRPr sz="2100" kern="1200">
+                  <a:solidFill>
+                    <a:schemeClr val="lt1"/>
+                  </a:solidFill>
+                  <a:latin typeface="+mn-lt"/>
+                  <a:ea typeface="+mn-ea"/>
+                  <a:cs typeface="+mn-cs"/>
+                </a:defRPr>
+              </a:lvl3pPr>
+              <a:lvl4pPr marL="1564584" algn="l" defTabSz="1043056" rtl="0" eaLnBrk="1" latinLnBrk="0" hangingPunct="1">
+                <a:defRPr sz="2100" kern="1200">
+                  <a:solidFill>
+                    <a:schemeClr val="lt1"/>
+                  </a:solidFill>
+                  <a:latin typeface="+mn-lt"/>
+                  <a:ea typeface="+mn-ea"/>
+                  <a:cs typeface="+mn-cs"/>
+                </a:defRPr>
+              </a:lvl4pPr>
+              <a:lvl5pPr marL="2086112" algn="l" defTabSz="1043056" rtl="0" eaLnBrk="1" latinLnBrk="0" hangingPunct="1">
+                <a:defRPr sz="2100" kern="1200">
+                  <a:solidFill>
+                    <a:schemeClr val="lt1"/>
+                  </a:solidFill>
+                  <a:latin typeface="+mn-lt"/>
+                  <a:ea typeface="+mn-ea"/>
+                  <a:cs typeface="+mn-cs"/>
+                </a:defRPr>
+              </a:lvl5pPr>
+              <a:lvl6pPr marL="2607640" algn="l" defTabSz="1043056" rtl="0" eaLnBrk="1" latinLnBrk="0" hangingPunct="1">
+                <a:defRPr sz="2100" kern="1200">
+                  <a:solidFill>
+                    <a:schemeClr val="lt1"/>
+                  </a:solidFill>
+                  <a:latin typeface="+mn-lt"/>
+                  <a:ea typeface="+mn-ea"/>
+                  <a:cs typeface="+mn-cs"/>
+                </a:defRPr>
+              </a:lvl6pPr>
+              <a:lvl7pPr marL="3129168" algn="l" defTabSz="1043056" rtl="0" eaLnBrk="1" latinLnBrk="0" hangingPunct="1">
+                <a:defRPr sz="2100" kern="1200">
+                  <a:solidFill>
+                    <a:schemeClr val="lt1"/>
+                  </a:solidFill>
+                  <a:latin typeface="+mn-lt"/>
+                  <a:ea typeface="+mn-ea"/>
+                  <a:cs typeface="+mn-cs"/>
+                </a:defRPr>
+              </a:lvl7pPr>
+              <a:lvl8pPr marL="3650696" algn="l" defTabSz="1043056" rtl="0" eaLnBrk="1" latinLnBrk="0" hangingPunct="1">
+                <a:defRPr sz="2100" kern="1200">
+                  <a:solidFill>
+                    <a:schemeClr val="lt1"/>
+                  </a:solidFill>
+                  <a:latin typeface="+mn-lt"/>
+                  <a:ea typeface="+mn-ea"/>
+                  <a:cs typeface="+mn-cs"/>
+                </a:defRPr>
+              </a:lvl8pPr>
+              <a:lvl9pPr marL="4172224" algn="l" defTabSz="1043056" rtl="0" eaLnBrk="1" latinLnBrk="0" hangingPunct="1">
+                <a:defRPr sz="2100" kern="1200">
+                  <a:solidFill>
+                    <a:schemeClr val="lt1"/>
+                  </a:solidFill>
+                  <a:latin typeface="+mn-lt"/>
+                  <a:ea typeface="+mn-ea"/>
+                  <a:cs typeface="+mn-cs"/>
+                </a:defRPr>
+              </a:lvl9pPr>
+            </a:lstStyle>
+            <a:p>
+              <a:pPr algn="ctr"/>
+              <a:endParaRPr lang="pt-BR" sz="2000" dirty="0">
+                <a:solidFill>
+                  <a:prstClr val="white"/>
+                </a:solidFill>
+                <a:latin typeface="Calibri"/>
+              </a:endParaRPr>
+            </a:p>
+          </p:txBody>
+        </p:sp>
+        <p:sp>
+          <p:nvSpPr>
+            <p:cNvPr id="38" name="Retângulo 37">
+              <a:extLst>
+                <a:ext uri="{FF2B5EF4-FFF2-40B4-BE49-F238E27FC236}">
+                  <a16:creationId xmlns:a16="http://schemas.microsoft.com/office/drawing/2014/main" id="{CDB189E7-A5E3-48DB-8C24-B6EB52351632}"/>
+                </a:ext>
+              </a:extLst>
+            </p:cNvPr>
+            <p:cNvSpPr/>
+            <p:nvPr/>
+          </p:nvSpPr>
+          <p:spPr>
+            <a:xfrm>
+              <a:off x="3475641" y="5706308"/>
+              <a:ext cx="2360997" cy="1042249"/>
+            </a:xfrm>
+            <a:prstGeom prst="rect">
+              <a:avLst/>
+            </a:prstGeom>
+          </p:spPr>
+          <p:txBody>
+            <a:bodyPr wrap="square">
+              <a:spAutoFit/>
+            </a:bodyPr>
+            <a:lstStyle>
+              <a:defPPr>
+                <a:defRPr lang="pt-BR"/>
+              </a:defPPr>
+              <a:lvl1pPr marL="0" algn="l" defTabSz="1043056" rtl="0" eaLnBrk="1" latinLnBrk="0" hangingPunct="1">
+                <a:defRPr sz="2100" kern="1200">
+                  <a:solidFill>
+                    <a:schemeClr val="tx1"/>
+                  </a:solidFill>
+                  <a:latin typeface="+mn-lt"/>
+                  <a:ea typeface="+mn-ea"/>
+                  <a:cs typeface="+mn-cs"/>
+                </a:defRPr>
+              </a:lvl1pPr>
+              <a:lvl2pPr marL="521528" algn="l" defTabSz="1043056" rtl="0" eaLnBrk="1" latinLnBrk="0" hangingPunct="1">
+                <a:defRPr sz="2100" kern="1200">
+                  <a:solidFill>
+                    <a:schemeClr val="tx1"/>
+                  </a:solidFill>
+                  <a:latin typeface="+mn-lt"/>
+                  <a:ea typeface="+mn-ea"/>
+                  <a:cs typeface="+mn-cs"/>
+                </a:defRPr>
+              </a:lvl2pPr>
+              <a:lvl3pPr marL="1043056" algn="l" defTabSz="1043056" rtl="0" eaLnBrk="1" latinLnBrk="0" hangingPunct="1">
+                <a:defRPr sz="2100" kern="1200">
+                  <a:solidFill>
+                    <a:schemeClr val="tx1"/>
+                  </a:solidFill>
+                  <a:latin typeface="+mn-lt"/>
+                  <a:ea typeface="+mn-ea"/>
+                  <a:cs typeface="+mn-cs"/>
+                </a:defRPr>
+              </a:lvl3pPr>
+              <a:lvl4pPr marL="1564584" algn="l" defTabSz="1043056" rtl="0" eaLnBrk="1" latinLnBrk="0" hangingPunct="1">
+                <a:defRPr sz="2100" kern="1200">
+                  <a:solidFill>
+                    <a:schemeClr val="tx1"/>
+                  </a:solidFill>
+                  <a:latin typeface="+mn-lt"/>
+                  <a:ea typeface="+mn-ea"/>
+                  <a:cs typeface="+mn-cs"/>
+                </a:defRPr>
+              </a:lvl4pPr>
+              <a:lvl5pPr marL="2086112" algn="l" defTabSz="1043056" rtl="0" eaLnBrk="1" latinLnBrk="0" hangingPunct="1">
+                <a:defRPr sz="2100" kern="1200">
+                  <a:solidFill>
+                    <a:schemeClr val="tx1"/>
+                  </a:solidFill>
+                  <a:latin typeface="+mn-lt"/>
+                  <a:ea typeface="+mn-ea"/>
+                  <a:cs typeface="+mn-cs"/>
+                </a:defRPr>
+              </a:lvl5pPr>
+              <a:lvl6pPr marL="2607640" algn="l" defTabSz="1043056" rtl="0" eaLnBrk="1" latinLnBrk="0" hangingPunct="1">
+                <a:defRPr sz="2100" kern="1200">
+                  <a:solidFill>
+                    <a:schemeClr val="tx1"/>
+                  </a:solidFill>
+                  <a:latin typeface="+mn-lt"/>
+                  <a:ea typeface="+mn-ea"/>
+                  <a:cs typeface="+mn-cs"/>
+                </a:defRPr>
+              </a:lvl6pPr>
+              <a:lvl7pPr marL="3129168" algn="l" defTabSz="1043056" rtl="0" eaLnBrk="1" latinLnBrk="0" hangingPunct="1">
+                <a:defRPr sz="2100" kern="1200">
+                  <a:solidFill>
+                    <a:schemeClr val="tx1"/>
+                  </a:solidFill>
+                  <a:latin typeface="+mn-lt"/>
+                  <a:ea typeface="+mn-ea"/>
+                  <a:cs typeface="+mn-cs"/>
+                </a:defRPr>
+              </a:lvl7pPr>
+              <a:lvl8pPr marL="3650696" algn="l" defTabSz="1043056" rtl="0" eaLnBrk="1" latinLnBrk="0" hangingPunct="1">
+                <a:defRPr sz="2100" kern="1200">
+                  <a:solidFill>
+                    <a:schemeClr val="tx1"/>
+                  </a:solidFill>
+                  <a:latin typeface="+mn-lt"/>
+                  <a:ea typeface="+mn-ea"/>
+                  <a:cs typeface="+mn-cs"/>
+                </a:defRPr>
+              </a:lvl8pPr>
+              <a:lvl9pPr marL="4172224" algn="l" defTabSz="1043056" rtl="0" eaLnBrk="1" latinLnBrk="0" hangingPunct="1">
+                <a:defRPr sz="2100" kern="1200">
+                  <a:solidFill>
+                    <a:schemeClr val="tx1"/>
+                  </a:solidFill>
+                  <a:latin typeface="+mn-lt"/>
+                  <a:ea typeface="+mn-ea"/>
+                  <a:cs typeface="+mn-cs"/>
+                </a:defRPr>
+              </a:lvl9pPr>
+            </a:lstStyle>
+            <a:p>
+              <a:pPr lvl="0" algn="ctr">
+                <a:defRPr/>
+              </a:pPr>
+              <a:r>
+                <a:rPr lang="pt-BR" sz="1400" dirty="0">
+                  <a:solidFill>
+                    <a:prstClr val="white"/>
+                  </a:solidFill>
+                </a:rPr>
+                <a:t>Validação por e-mail do usuário ao acessar o sistema</a:t>
+              </a:r>
+            </a:p>
+          </p:txBody>
+        </p:sp>
+        <p:sp>
+          <p:nvSpPr>
+            <p:cNvPr id="39" name="Retângulo 38">
+              <a:extLst>
+                <a:ext uri="{FF2B5EF4-FFF2-40B4-BE49-F238E27FC236}">
+                  <a16:creationId xmlns:a16="http://schemas.microsoft.com/office/drawing/2014/main" id="{E60F5B91-E3B6-4DCA-B413-A4B439ADA0DD}"/>
+                </a:ext>
+              </a:extLst>
+            </p:cNvPr>
+            <p:cNvSpPr/>
+            <p:nvPr/>
+          </p:nvSpPr>
+          <p:spPr>
+            <a:xfrm>
+              <a:off x="3170272" y="4675508"/>
+              <a:ext cx="2987399" cy="825113"/>
+            </a:xfrm>
+            <a:prstGeom prst="rect">
+              <a:avLst/>
+            </a:prstGeom>
+          </p:spPr>
+          <p:txBody>
+            <a:bodyPr wrap="square">
+              <a:spAutoFit/>
+            </a:bodyPr>
+            <a:lstStyle>
+              <a:defPPr>
+                <a:defRPr lang="pt-BR"/>
+              </a:defPPr>
+              <a:lvl1pPr marL="0" algn="l" defTabSz="1043056" rtl="0" eaLnBrk="1" latinLnBrk="0" hangingPunct="1">
+                <a:defRPr sz="2100" kern="1200">
+                  <a:solidFill>
+                    <a:schemeClr val="tx1"/>
+                  </a:solidFill>
+                  <a:latin typeface="+mn-lt"/>
+                  <a:ea typeface="+mn-ea"/>
+                  <a:cs typeface="+mn-cs"/>
+                </a:defRPr>
+              </a:lvl1pPr>
+              <a:lvl2pPr marL="521528" algn="l" defTabSz="1043056" rtl="0" eaLnBrk="1" latinLnBrk="0" hangingPunct="1">
+                <a:defRPr sz="2100" kern="1200">
+                  <a:solidFill>
+                    <a:schemeClr val="tx1"/>
+                  </a:solidFill>
+                  <a:latin typeface="+mn-lt"/>
+                  <a:ea typeface="+mn-ea"/>
+                  <a:cs typeface="+mn-cs"/>
+                </a:defRPr>
+              </a:lvl2pPr>
+              <a:lvl3pPr marL="1043056" algn="l" defTabSz="1043056" rtl="0" eaLnBrk="1" latinLnBrk="0" hangingPunct="1">
+                <a:defRPr sz="2100" kern="1200">
+                  <a:solidFill>
+                    <a:schemeClr val="tx1"/>
+                  </a:solidFill>
+                  <a:latin typeface="+mn-lt"/>
+                  <a:ea typeface="+mn-ea"/>
+                  <a:cs typeface="+mn-cs"/>
+                </a:defRPr>
+              </a:lvl3pPr>
+              <a:lvl4pPr marL="1564584" algn="l" defTabSz="1043056" rtl="0" eaLnBrk="1" latinLnBrk="0" hangingPunct="1">
+                <a:defRPr sz="2100" kern="1200">
+                  <a:solidFill>
+                    <a:schemeClr val="tx1"/>
+                  </a:solidFill>
+                  <a:latin typeface="+mn-lt"/>
+                  <a:ea typeface="+mn-ea"/>
+                  <a:cs typeface="+mn-cs"/>
+                </a:defRPr>
+              </a:lvl4pPr>
+              <a:lvl5pPr marL="2086112" algn="l" defTabSz="1043056" rtl="0" eaLnBrk="1" latinLnBrk="0" hangingPunct="1">
+                <a:defRPr sz="2100" kern="1200">
+                  <a:solidFill>
+                    <a:schemeClr val="tx1"/>
+                  </a:solidFill>
+                  <a:latin typeface="+mn-lt"/>
+                  <a:ea typeface="+mn-ea"/>
+                  <a:cs typeface="+mn-cs"/>
+                </a:defRPr>
+              </a:lvl5pPr>
+              <a:lvl6pPr marL="2607640" algn="l" defTabSz="1043056" rtl="0" eaLnBrk="1" latinLnBrk="0" hangingPunct="1">
+                <a:defRPr sz="2100" kern="1200">
+                  <a:solidFill>
+                    <a:schemeClr val="tx1"/>
+                  </a:solidFill>
+                  <a:latin typeface="+mn-lt"/>
+                  <a:ea typeface="+mn-ea"/>
+                  <a:cs typeface="+mn-cs"/>
+                </a:defRPr>
+              </a:lvl6pPr>
+              <a:lvl7pPr marL="3129168" algn="l" defTabSz="1043056" rtl="0" eaLnBrk="1" latinLnBrk="0" hangingPunct="1">
+                <a:defRPr sz="2100" kern="1200">
+                  <a:solidFill>
+                    <a:schemeClr val="tx1"/>
+                  </a:solidFill>
+                  <a:latin typeface="+mn-lt"/>
+                  <a:ea typeface="+mn-ea"/>
+                  <a:cs typeface="+mn-cs"/>
+                </a:defRPr>
+              </a:lvl7pPr>
+              <a:lvl8pPr marL="3650696" algn="l" defTabSz="1043056" rtl="0" eaLnBrk="1" latinLnBrk="0" hangingPunct="1">
+                <a:defRPr sz="2100" kern="1200">
+                  <a:solidFill>
+                    <a:schemeClr val="tx1"/>
+                  </a:solidFill>
+                  <a:latin typeface="+mn-lt"/>
+                  <a:ea typeface="+mn-ea"/>
+                  <a:cs typeface="+mn-cs"/>
+                </a:defRPr>
+              </a:lvl8pPr>
+              <a:lvl9pPr marL="4172224" algn="l" defTabSz="1043056" rtl="0" eaLnBrk="1" latinLnBrk="0" hangingPunct="1">
+                <a:defRPr sz="2100" kern="1200">
+                  <a:solidFill>
+                    <a:schemeClr val="tx1"/>
+                  </a:solidFill>
+                  <a:latin typeface="+mn-lt"/>
+                  <a:ea typeface="+mn-ea"/>
+                  <a:cs typeface="+mn-cs"/>
+                </a:defRPr>
+              </a:lvl9pPr>
+            </a:lstStyle>
+            <a:p>
+              <a:pPr lvl="0" algn="ctr">
+                <a:defRPr/>
+              </a:pPr>
+              <a:r>
+                <a:rPr lang="pt-BR" sz="1800" b="1" dirty="0">
+                  <a:solidFill>
+                    <a:prstClr val="white"/>
+                  </a:solidFill>
+                </a:rPr>
+                <a:t>Segurança</a:t>
+              </a:r>
+            </a:p>
+            <a:p>
+              <a:pPr lvl="0" algn="ctr">
+                <a:defRPr/>
+              </a:pPr>
+              <a:r>
+                <a:rPr lang="pt-BR" sz="1400" dirty="0">
+                  <a:solidFill>
+                    <a:prstClr val="white"/>
+                  </a:solidFill>
+                </a:rPr>
+                <a:t>[Container: Phyton Service]</a:t>
+              </a:r>
+            </a:p>
+          </p:txBody>
+        </p:sp>
+      </p:grpSp>
+      <p:cxnSp>
+        <p:nvCxnSpPr>
+          <p:cNvPr id="40" name="Conector de Seta Reta 107">
+            <a:extLst>
+              <a:ext uri="{FF2B5EF4-FFF2-40B4-BE49-F238E27FC236}">
+                <a16:creationId xmlns:a16="http://schemas.microsoft.com/office/drawing/2014/main" id="{E5498DCF-FCFF-4AEB-8C0B-102646238BB7}"/>
+              </a:ext>
+            </a:extLst>
+          </p:cNvPr>
+          <p:cNvCxnSpPr>
+            <a:cxnSpLocks/>
+            <a:endCxn id="37" idx="1"/>
+          </p:cNvCxnSpPr>
+          <p:nvPr/>
+        </p:nvCxnSpPr>
+        <p:spPr>
+          <a:xfrm>
+            <a:off x="9281439" y="1895348"/>
+            <a:ext cx="732842" cy="0"/>
           </a:xfrm>
           <a:prstGeom prst="straightConnector1">
             <a:avLst/>
@@ -8924,6 +9968,33 @@
                                   </p:childTnLst>
                                 </p:cTn>
                               </p:par>
+                              <p:par>
+                                <p:cTn id="19" presetID="1" presetClass="entr" presetSubtype="0" fill="hold" nodeType="withEffect">
+                                  <p:stCondLst>
+                                    <p:cond delay="0"/>
+                                  </p:stCondLst>
+                                  <p:childTnLst>
+                                    <p:set>
+                                      <p:cBhvr>
+                                        <p:cTn id="20" dur="1" fill="hold">
+                                          <p:stCondLst>
+                                            <p:cond delay="0"/>
+                                          </p:stCondLst>
+                                        </p:cTn>
+                                        <p:tgtEl>
+                                          <p:spTgt spid="40"/>
+                                        </p:tgtEl>
+                                        <p:attrNameLst>
+                                          <p:attrName>style.visibility</p:attrName>
+                                        </p:attrNameLst>
+                                      </p:cBhvr>
+                                      <p:to>
+                                        <p:strVal val="visible"/>
+                                      </p:to>
+                                    </p:set>
+                                  </p:childTnLst>
+                                </p:cTn>
+                              </p:par>
                             </p:childTnLst>
                           </p:cTn>
                         </p:par>
@@ -8989,8 +10060,8 @@
         </p:nvSpPr>
         <p:spPr>
           <a:xfrm>
-            <a:off x="2757802" y="366524"/>
-            <a:ext cx="8594782" cy="3959181"/>
+            <a:off x="2593163" y="366524"/>
+            <a:ext cx="6727530" cy="3959181"/>
           </a:xfrm>
           <a:prstGeom prst="rect">
             <a:avLst/>
@@ -9911,7 +10982,7 @@
         </p:nvGrpSpPr>
         <p:grpSpPr>
           <a:xfrm>
-            <a:off x="8655044" y="570028"/>
+            <a:off x="9835760" y="1281476"/>
             <a:ext cx="2240677" cy="1469214"/>
             <a:chOff x="3170272" y="4675508"/>
             <a:chExt cx="2987399" cy="2073049"/>
@@ -10063,7 +11134,7 @@
             </a:lstStyle>
             <a:p>
               <a:pPr algn="ctr"/>
-              <a:endParaRPr lang="pt-BR" sz="2000">
+              <a:endParaRPr lang="pt-BR" sz="2000" dirty="0">
                 <a:solidFill>
                   <a:prstClr val="white"/>
                 </a:solidFill>
@@ -10222,7 +11293,7 @@
           <p:spPr>
             <a:xfrm>
               <a:off x="3170272" y="4675508"/>
-              <a:ext cx="2987399" cy="1129102"/>
+              <a:ext cx="2987399" cy="825113"/>
             </a:xfrm>
             <a:prstGeom prst="rect">
               <a:avLst/>
@@ -10350,7 +11421,7 @@
                     <a:prstClr val="white"/>
                   </a:solidFill>
                 </a:rPr>
-                <a:t>[Componente: Phyton Service]</a:t>
+                <a:t>[Container: Phyton Service]</a:t>
               </a:r>
             </a:p>
           </p:txBody>
@@ -10846,7 +11917,7 @@
         </p:nvSpPr>
         <p:spPr>
           <a:xfrm>
-            <a:off x="9613152" y="4092324"/>
+            <a:off x="7495637" y="4066078"/>
             <a:ext cx="1001493" cy="307777"/>
           </a:xfrm>
           <a:prstGeom prst="rect">
@@ -11285,7 +12356,7 @@
         </p:nvGrpSpPr>
         <p:grpSpPr>
           <a:xfrm>
-            <a:off x="8080928" y="2518705"/>
+            <a:off x="6974341" y="944328"/>
             <a:ext cx="2032971" cy="1405813"/>
             <a:chOff x="8813686" y="1524475"/>
             <a:chExt cx="2588120" cy="2016224"/>
@@ -12500,54 +13571,6 @@
       </p:grpSp>
       <p:cxnSp>
         <p:nvCxnSpPr>
-          <p:cNvPr id="42" name="Conector de Seta Reta 107">
-            <a:extLst>
-              <a:ext uri="{FF2B5EF4-FFF2-40B4-BE49-F238E27FC236}">
-                <a16:creationId xmlns:a16="http://schemas.microsoft.com/office/drawing/2014/main" id="{6AE2195E-8F83-4F6B-B17D-3B7249014C2B}"/>
-              </a:ext>
-            </a:extLst>
-          </p:cNvPr>
-          <p:cNvCxnSpPr>
-            <a:cxnSpLocks/>
-          </p:cNvCxnSpPr>
-          <p:nvPr/>
-        </p:nvCxnSpPr>
-        <p:spPr>
-          <a:xfrm flipV="1">
-            <a:off x="3532340" y="3933853"/>
-            <a:ext cx="4618498" cy="662851"/>
-          </a:xfrm>
-          <a:prstGeom prst="straightConnector1">
-            <a:avLst/>
-          </a:prstGeom>
-          <a:ln w="19050">
-            <a:solidFill>
-              <a:schemeClr val="accent5">
-                <a:lumMod val="75000"/>
-              </a:schemeClr>
-            </a:solidFill>
-            <a:prstDash val="sysDash"/>
-            <a:headEnd type="none" w="lg" len="lg"/>
-            <a:tailEnd type="triangle" w="lg" len="lg"/>
-          </a:ln>
-        </p:spPr>
-        <p:style>
-          <a:lnRef idx="1">
-            <a:schemeClr val="accent1"/>
-          </a:lnRef>
-          <a:fillRef idx="0">
-            <a:schemeClr val="accent1"/>
-          </a:fillRef>
-          <a:effectRef idx="0">
-            <a:schemeClr val="accent1"/>
-          </a:effectRef>
-          <a:fontRef idx="minor">
-            <a:schemeClr val="tx1"/>
-          </a:fontRef>
-        </p:style>
-      </p:cxnSp>
-      <p:cxnSp>
-        <p:nvCxnSpPr>
           <p:cNvPr id="43" name="Conector de Seta Reta 107">
             <a:extLst>
               <a:ext uri="{FF2B5EF4-FFF2-40B4-BE49-F238E27FC236}">
@@ -12561,9 +13584,9 @@
           <p:nvPr/>
         </p:nvCxnSpPr>
         <p:spPr>
-          <a:xfrm flipV="1">
-            <a:off x="9035510" y="2042679"/>
-            <a:ext cx="38837" cy="449942"/>
+          <a:xfrm>
+            <a:off x="8910809" y="1752681"/>
+            <a:ext cx="1022931" cy="404375"/>
           </a:xfrm>
           <a:prstGeom prst="straightConnector1">
             <a:avLst/>
@@ -12701,13 +13724,14 @@
           </p:cNvPr>
           <p:cNvCxnSpPr>
             <a:cxnSpLocks/>
+            <a:stCxn id="23" idx="1"/>
           </p:cNvCxnSpPr>
           <p:nvPr/>
         </p:nvCxnSpPr>
         <p:spPr>
           <a:xfrm flipH="1" flipV="1">
-            <a:off x="5207652" y="1468093"/>
-            <a:ext cx="3364445" cy="1024528"/>
+            <a:off x="5207653" y="1468095"/>
+            <a:ext cx="1836598" cy="179140"/>
           </a:xfrm>
           <a:prstGeom prst="straightConnector1">
             <a:avLst/>
@@ -12883,54 +13907,6 @@
           </a:fontRef>
         </p:style>
       </p:cxnSp>
-      <p:cxnSp>
-        <p:nvCxnSpPr>
-          <p:cNvPr id="50" name="Conector de Seta Reta 107">
-            <a:extLst>
-              <a:ext uri="{FF2B5EF4-FFF2-40B4-BE49-F238E27FC236}">
-                <a16:creationId xmlns:a16="http://schemas.microsoft.com/office/drawing/2014/main" id="{1EA3C3B3-9DD8-44E8-8E3E-A1C716EF7A97}"/>
-              </a:ext>
-            </a:extLst>
-          </p:cNvPr>
-          <p:cNvCxnSpPr>
-            <a:cxnSpLocks/>
-          </p:cNvCxnSpPr>
-          <p:nvPr/>
-        </p:nvCxnSpPr>
-        <p:spPr>
-          <a:xfrm flipV="1">
-            <a:off x="7195737" y="3924518"/>
-            <a:ext cx="1262105" cy="950095"/>
-          </a:xfrm>
-          <a:prstGeom prst="straightConnector1">
-            <a:avLst/>
-          </a:prstGeom>
-          <a:ln w="19050">
-            <a:solidFill>
-              <a:schemeClr val="accent5">
-                <a:lumMod val="75000"/>
-              </a:schemeClr>
-            </a:solidFill>
-            <a:prstDash val="sysDash"/>
-            <a:headEnd type="none" w="lg" len="lg"/>
-            <a:tailEnd type="triangle" w="lg" len="lg"/>
-          </a:ln>
-        </p:spPr>
-        <p:style>
-          <a:lnRef idx="1">
-            <a:schemeClr val="accent1"/>
-          </a:lnRef>
-          <a:fillRef idx="0">
-            <a:schemeClr val="accent1"/>
-          </a:fillRef>
-          <a:effectRef idx="0">
-            <a:schemeClr val="accent1"/>
-          </a:effectRef>
-          <a:fontRef idx="minor">
-            <a:schemeClr val="tx1"/>
-          </a:fontRef>
-        </p:style>
-      </p:cxnSp>
       <p:grpSp>
         <p:nvGrpSpPr>
           <p:cNvPr id="57" name="Group 38">
@@ -13555,6 +14531,90 @@
           </a:p>
         </p:txBody>
       </p:sp>
+      <p:cxnSp>
+        <p:nvCxnSpPr>
+          <p:cNvPr id="54" name="Conector: Angulado 53">
+            <a:extLst>
+              <a:ext uri="{FF2B5EF4-FFF2-40B4-BE49-F238E27FC236}">
+                <a16:creationId xmlns:a16="http://schemas.microsoft.com/office/drawing/2014/main" id="{10C46DC8-B3E4-4402-8FC3-B824ABEB4790}"/>
+              </a:ext>
+            </a:extLst>
+          </p:cNvPr>
+          <p:cNvCxnSpPr/>
+          <p:nvPr/>
+        </p:nvCxnSpPr>
+        <p:spPr>
+          <a:xfrm rot="5400000" flipH="1" flipV="1">
+            <a:off x="6550738" y="3035365"/>
+            <a:ext cx="2548128" cy="1233666"/>
+          </a:xfrm>
+          <a:prstGeom prst="bentConnector3">
+            <a:avLst>
+              <a:gd name="adj1" fmla="val 593"/>
+            </a:avLst>
+          </a:prstGeom>
+          <a:ln>
+            <a:tailEnd type="triangle"/>
+          </a:ln>
+        </p:spPr>
+        <p:style>
+          <a:lnRef idx="1">
+            <a:schemeClr val="accent1"/>
+          </a:lnRef>
+          <a:fillRef idx="0">
+            <a:schemeClr val="accent1"/>
+          </a:fillRef>
+          <a:effectRef idx="0">
+            <a:schemeClr val="accent1"/>
+          </a:effectRef>
+          <a:fontRef idx="minor">
+            <a:schemeClr val="tx1"/>
+          </a:fontRef>
+        </p:style>
+      </p:cxnSp>
+      <p:cxnSp>
+        <p:nvCxnSpPr>
+          <p:cNvPr id="68" name="Conector: Curvo 67">
+            <a:extLst>
+              <a:ext uri="{FF2B5EF4-FFF2-40B4-BE49-F238E27FC236}">
+                <a16:creationId xmlns:a16="http://schemas.microsoft.com/office/drawing/2014/main" id="{8743135D-2C33-4411-96BE-5BE0D0B56940}"/>
+              </a:ext>
+            </a:extLst>
+          </p:cNvPr>
+          <p:cNvCxnSpPr>
+            <a:cxnSpLocks/>
+          </p:cNvCxnSpPr>
+          <p:nvPr/>
+        </p:nvCxnSpPr>
+        <p:spPr>
+          <a:xfrm flipV="1">
+            <a:off x="4177017" y="2391200"/>
+            <a:ext cx="3959818" cy="2173104"/>
+          </a:xfrm>
+          <a:prstGeom prst="curvedConnector3">
+            <a:avLst>
+              <a:gd name="adj1" fmla="val 100869"/>
+            </a:avLst>
+          </a:prstGeom>
+          <a:ln>
+            <a:tailEnd type="triangle"/>
+          </a:ln>
+        </p:spPr>
+        <p:style>
+          <a:lnRef idx="1">
+            <a:schemeClr val="accent1"/>
+          </a:lnRef>
+          <a:fillRef idx="0">
+            <a:schemeClr val="accent1"/>
+          </a:fillRef>
+          <a:effectRef idx="0">
+            <a:schemeClr val="accent1"/>
+          </a:effectRef>
+          <a:fontRef idx="minor">
+            <a:schemeClr val="tx1"/>
+          </a:fontRef>
+        </p:style>
+      </p:cxnSp>
     </p:spTree>
     <p:extLst>
       <p:ext uri="{BB962C8B-B14F-4D97-AF65-F5344CB8AC3E}">
@@ -13656,7 +14716,7 @@
                                           </p:stCondLst>
                                         </p:cTn>
                                         <p:tgtEl>
-                                          <p:spTgt spid="42"/>
+                                          <p:spTgt spid="43"/>
                                         </p:tgtEl>
                                         <p:attrNameLst>
                                           <p:attrName>style.visibility</p:attrName>
@@ -13683,7 +14743,7 @@
                                           </p:stCondLst>
                                         </p:cTn>
                                         <p:tgtEl>
-                                          <p:spTgt spid="43"/>
+                                          <p:spTgt spid="44"/>
                                         </p:tgtEl>
                                         <p:attrNameLst>
                                           <p:attrName>style.visibility</p:attrName>
@@ -13710,7 +14770,7 @@
                                           </p:stCondLst>
                                         </p:cTn>
                                         <p:tgtEl>
-                                          <p:spTgt spid="44"/>
+                                          <p:spTgt spid="45"/>
                                         </p:tgtEl>
                                         <p:attrNameLst>
                                           <p:attrName>style.visibility</p:attrName>
@@ -13737,7 +14797,7 @@
                                           </p:stCondLst>
                                         </p:cTn>
                                         <p:tgtEl>
-                                          <p:spTgt spid="45"/>
+                                          <p:spTgt spid="46"/>
                                         </p:tgtEl>
                                         <p:attrNameLst>
                                           <p:attrName>style.visibility</p:attrName>
@@ -13764,7 +14824,7 @@
                                           </p:stCondLst>
                                         </p:cTn>
                                         <p:tgtEl>
-                                          <p:spTgt spid="46"/>
+                                          <p:spTgt spid="47"/>
                                         </p:tgtEl>
                                         <p:attrNameLst>
                                           <p:attrName>style.visibility</p:attrName>
@@ -13791,7 +14851,7 @@
                                           </p:stCondLst>
                                         </p:cTn>
                                         <p:tgtEl>
-                                          <p:spTgt spid="47"/>
+                                          <p:spTgt spid="48"/>
                                         </p:tgtEl>
                                         <p:attrNameLst>
                                           <p:attrName>style.visibility</p:attrName>
@@ -13818,61 +14878,7 @@
                                           </p:stCondLst>
                                         </p:cTn>
                                         <p:tgtEl>
-                                          <p:spTgt spid="48"/>
-                                        </p:tgtEl>
-                                        <p:attrNameLst>
-                                          <p:attrName>style.visibility</p:attrName>
-                                        </p:attrNameLst>
-                                      </p:cBhvr>
-                                      <p:to>
-                                        <p:strVal val="visible"/>
-                                      </p:to>
-                                    </p:set>
-                                  </p:childTnLst>
-                                </p:cTn>
-                              </p:par>
-                              <p:par>
-                                <p:cTn id="23" presetID="1" presetClass="entr" presetSubtype="0" fill="hold" nodeType="withEffect">
-                                  <p:stCondLst>
-                                    <p:cond delay="0"/>
-                                  </p:stCondLst>
-                                  <p:childTnLst>
-                                    <p:set>
-                                      <p:cBhvr>
-                                        <p:cTn id="24" dur="1" fill="hold">
-                                          <p:stCondLst>
-                                            <p:cond delay="0"/>
-                                          </p:stCondLst>
-                                        </p:cTn>
-                                        <p:tgtEl>
                                           <p:spTgt spid="49"/>
-                                        </p:tgtEl>
-                                        <p:attrNameLst>
-                                          <p:attrName>style.visibility</p:attrName>
-                                        </p:attrNameLst>
-                                      </p:cBhvr>
-                                      <p:to>
-                                        <p:strVal val="visible"/>
-                                      </p:to>
-                                    </p:set>
-                                  </p:childTnLst>
-                                </p:cTn>
-                              </p:par>
-                              <p:par>
-                                <p:cTn id="25" presetID="1" presetClass="entr" presetSubtype="0" fill="hold" nodeType="withEffect">
-                                  <p:stCondLst>
-                                    <p:cond delay="0"/>
-                                  </p:stCondLst>
-                                  <p:childTnLst>
-                                    <p:set>
-                                      <p:cBhvr>
-                                        <p:cTn id="26" dur="1" fill="hold">
-                                          <p:stCondLst>
-                                            <p:cond delay="0"/>
-                                          </p:stCondLst>
-                                        </p:cTn>
-                                        <p:tgtEl>
-                                          <p:spTgt spid="50"/>
                                         </p:tgtEl>
                                         <p:attrNameLst>
                                           <p:attrName>style.visibility</p:attrName>
@@ -20666,7 +21672,7 @@
         <p:spPr>
           <a:xfrm>
             <a:off x="1067345" y="1482026"/>
-            <a:ext cx="10057310" cy="2855077"/>
+            <a:ext cx="10057310" cy="5115503"/>
           </a:xfrm>
           <a:prstGeom prst="rect">
             <a:avLst/>
@@ -20679,12 +21685,23 @@
           </a:bodyPr>
           <a:lstStyle/>
           <a:p>
+            <a:pPr marL="285750" indent="-285750">
+              <a:buFont typeface="Arial" panose="020B0604020202020204" pitchFamily="34" charset="0"/>
+              <a:buChar char="•"/>
+            </a:pPr>
             <a:r>
               <a:rPr lang="pt-BR" sz="1632" dirty="0"/>
-              <a:t>Estamos utilizando o database do AzureSQLServer, onde ficará salvo todo nosso banco de dados e temos um backup no MYSQL, caso aconteça algum problema</a:t>
+              <a:t>Estamos utilizando o database do AzureSQLServer, onde ficará salvo todo nosso banco de dados e temos um backup no MYSQL, caso aconteça algum problema, o Azure também garante uma consistência maior de dados que podem ser acessados por aplicações, ambientes e máquinas que estão em lugares diferentes;</a:t>
             </a:r>
           </a:p>
           <a:p>
+            <a:endParaRPr lang="pt-BR" sz="1632" dirty="0"/>
+          </a:p>
+          <a:p>
+            <a:pPr marL="285750" indent="-285750">
+              <a:buFont typeface="Arial" panose="020B0604020202020204" pitchFamily="34" charset="0"/>
+              <a:buChar char="•"/>
+            </a:pPr>
             <a:r>
               <a:rPr lang="pt-BR" sz="1632" dirty="0"/>
               <a:t>Estamos usando uma </a:t>
@@ -20695,20 +21712,95 @@
             </a:r>
             <a:r>
               <a:rPr lang="pt-BR" sz="1632" dirty="0"/>
-              <a:t> do Google Books, onde será feita a requisição dos dados tudo via front e salvaremos em nosso database apenas os dados relevantes para nós, como nome, descrição, tipo do livro e também possui alguns atributos a mais que implementamos para melhor adequar o sistema, como disponibilidade do livro.</a:t>
+              <a:t> do Google Books, onde será feita a requisição dos dados tudo via front e salvaremos em nosso database apenas os dados relevantes para nós, como nome, descrição, tipo do livro e também possui alguns atributos a mais que implementamos para se adequar ao nosso sistema, como disponibilidade do livro e também disponibilizar </a:t>
+            </a:r>
+            <a:r>
+              <a:rPr lang="pt-BR" sz="1632" dirty="0" err="1"/>
+              <a:t>eBooks</a:t>
+            </a:r>
+            <a:r>
+              <a:rPr lang="pt-BR" sz="1632" dirty="0"/>
+              <a:t> e outras informações de livros que não estão em nossa base de dados;</a:t>
             </a:r>
           </a:p>
           <a:p>
+            <a:pPr marL="285750" indent="-285750">
+              <a:buFont typeface="Arial" panose="020B0604020202020204" pitchFamily="34" charset="0"/>
+              <a:buChar char="•"/>
+            </a:pPr>
+            <a:endParaRPr lang="pt-BR" sz="1632" dirty="0"/>
+          </a:p>
+          <a:p>
+            <a:pPr marL="285750" indent="-285750">
+              <a:buFont typeface="Arial" panose="020B0604020202020204" pitchFamily="34" charset="0"/>
+              <a:buChar char="•"/>
+            </a:pPr>
             <a:r>
               <a:rPr lang="pt-BR" sz="1632" dirty="0"/>
-              <a:t>A nossa web Application onde terá toda a conexão com o banco e que o nosso front vai consumir direto da nossa web Application, escolhemos a utilização de Java, pois é uma linguagem que conseguimos melhor aplicar nosso projeto </a:t>
+              <a:t>A nossa web Application onde terá toda a conexão com o banco e que o nosso front vai consumir direto da nossa web Application, utilizamos Java, pois é uma linguagem que possui maior capacidade de adaptação em </a:t>
+            </a:r>
+            <a:r>
+              <a:rPr lang="pt-BR" sz="1632" dirty="0" err="1"/>
+              <a:t>S.Os</a:t>
+            </a:r>
+            <a:r>
+              <a:rPr lang="pt-BR" sz="1632" dirty="0"/>
+              <a:t> diferentes, sendo uma linguagem bastante difundida no atual cenário da tecnologia;</a:t>
             </a:r>
           </a:p>
           <a:p>
+            <a:pPr marL="285750" indent="-285750">
+              <a:buFont typeface="Arial" panose="020B0604020202020204" pitchFamily="34" charset="0"/>
+              <a:buChar char="•"/>
+            </a:pPr>
+            <a:endParaRPr lang="pt-BR" sz="1632" dirty="0"/>
+          </a:p>
+          <a:p>
+            <a:pPr marL="285750" indent="-285750">
+              <a:buFont typeface="Arial" panose="020B0604020202020204" pitchFamily="34" charset="0"/>
+              <a:buChar char="•"/>
+            </a:pPr>
             <a:r>
               <a:rPr lang="pt-BR" sz="1632" dirty="0"/>
-              <a:t>No nosso front, utilizaremos React, Html, Css e Js, linguagens em que os integrantes mais estão familiarizados, e pensando na escalabilidade para o próximo semestre, adicionamos um container de mobile, onde será feito em Kotlin para Android, e em paralelo fazer em React Native, onde atende Android e IOS.  </a:t>
+              <a:t>Foi utilizada arquitetura de </a:t>
             </a:r>
+            <a:r>
+              <a:rPr lang="pt-BR" sz="1632" dirty="0" err="1"/>
+              <a:t>microserviços</a:t>
+            </a:r>
+            <a:r>
+              <a:rPr lang="pt-BR" sz="1632" dirty="0"/>
+              <a:t> para garantir uma maior escalabilidade do projeto, permitindo que diversos front-</a:t>
+            </a:r>
+            <a:r>
+              <a:rPr lang="pt-BR" sz="1632" dirty="0" err="1"/>
+              <a:t>ends</a:t>
+            </a:r>
+            <a:r>
+              <a:rPr lang="pt-BR" sz="1632" dirty="0"/>
+              <a:t> em diversas </a:t>
+            </a:r>
+            <a:r>
+              <a:rPr lang="pt-BR" sz="1632"/>
+              <a:t>plataformas diferentes.</a:t>
+            </a:r>
+            <a:endParaRPr lang="pt-BR" sz="1632" dirty="0"/>
+          </a:p>
+          <a:p>
+            <a:endParaRPr lang="pt-BR" sz="1632" dirty="0"/>
+          </a:p>
+          <a:p>
+            <a:pPr marL="285750" indent="-285750">
+              <a:buFont typeface="Arial" panose="020B0604020202020204" pitchFamily="34" charset="0"/>
+              <a:buChar char="•"/>
+            </a:pPr>
+            <a:r>
+              <a:rPr lang="pt-BR" sz="1632" dirty="0"/>
+              <a:t>No nosso front, utilizaremos React, Html, Css e Js, linguagens em que os integrantes estão mais familiarizados, e pensando na escalabilidade, adicionamos um container de mobile, onde será feito em Kotlin para Android, e em paralelo fazer em React Native, onde atende Android e IOS.  </a:t>
+            </a:r>
+          </a:p>
+          <a:p>
+            <a:endParaRPr lang="pt-BR" sz="1632" dirty="0"/>
           </a:p>
         </p:txBody>
       </p:sp>

</xml_diff>